<commit_message>
trying to do a bit of work
</commit_message>
<xml_diff>
--- a/Informational Technology (Game Design)/Part 2 Redo/Cluster 3D game development/AT03/AI Behaviour Chart.pptx
+++ b/Informational Technology (Game Design)/Part 2 Redo/Cluster 3D game development/AT03/AI Behaviour Chart.pptx
@@ -105,6 +105,11 @@
       </a:defRPr>
     </a:lvl9pPr>
   </p:defaultTextStyle>
+  <p:extLst>
+    <p:ext uri="{EFAFB233-063F-42B5-8137-9DF3F51BA10A}">
+      <p15:sldGuideLst xmlns:p15="http://schemas.microsoft.com/office/powerpoint/2012/main"/>
+    </p:ext>
+  </p:extLst>
 </p:presentation>
 </file>
 
@@ -257,7 +262,7 @@
           <a:p>
             <a:fld id="{8BCDE12B-C777-427F-8CA4-5EC371F042CC}" type="datetimeFigureOut">
               <a:rPr lang="en-AU" smtClean="0"/>
-              <a:t>23/08/2023</a:t>
+              <a:t>26/10/2023</a:t>
             </a:fld>
             <a:endParaRPr lang="en-AU"/>
           </a:p>
@@ -457,7 +462,7 @@
           <a:p>
             <a:fld id="{8BCDE12B-C777-427F-8CA4-5EC371F042CC}" type="datetimeFigureOut">
               <a:rPr lang="en-AU" smtClean="0"/>
-              <a:t>23/08/2023</a:t>
+              <a:t>26/10/2023</a:t>
             </a:fld>
             <a:endParaRPr lang="en-AU"/>
           </a:p>
@@ -667,7 +672,7 @@
           <a:p>
             <a:fld id="{8BCDE12B-C777-427F-8CA4-5EC371F042CC}" type="datetimeFigureOut">
               <a:rPr lang="en-AU" smtClean="0"/>
-              <a:t>23/08/2023</a:t>
+              <a:t>26/10/2023</a:t>
             </a:fld>
             <a:endParaRPr lang="en-AU"/>
           </a:p>
@@ -867,7 +872,7 @@
           <a:p>
             <a:fld id="{8BCDE12B-C777-427F-8CA4-5EC371F042CC}" type="datetimeFigureOut">
               <a:rPr lang="en-AU" smtClean="0"/>
-              <a:t>23/08/2023</a:t>
+              <a:t>26/10/2023</a:t>
             </a:fld>
             <a:endParaRPr lang="en-AU"/>
           </a:p>
@@ -1143,7 +1148,7 @@
           <a:p>
             <a:fld id="{8BCDE12B-C777-427F-8CA4-5EC371F042CC}" type="datetimeFigureOut">
               <a:rPr lang="en-AU" smtClean="0"/>
-              <a:t>23/08/2023</a:t>
+              <a:t>26/10/2023</a:t>
             </a:fld>
             <a:endParaRPr lang="en-AU"/>
           </a:p>
@@ -1411,7 +1416,7 @@
           <a:p>
             <a:fld id="{8BCDE12B-C777-427F-8CA4-5EC371F042CC}" type="datetimeFigureOut">
               <a:rPr lang="en-AU" smtClean="0"/>
-              <a:t>23/08/2023</a:t>
+              <a:t>26/10/2023</a:t>
             </a:fld>
             <a:endParaRPr lang="en-AU"/>
           </a:p>
@@ -1826,7 +1831,7 @@
           <a:p>
             <a:fld id="{8BCDE12B-C777-427F-8CA4-5EC371F042CC}" type="datetimeFigureOut">
               <a:rPr lang="en-AU" smtClean="0"/>
-              <a:t>23/08/2023</a:t>
+              <a:t>26/10/2023</a:t>
             </a:fld>
             <a:endParaRPr lang="en-AU"/>
           </a:p>
@@ -1968,7 +1973,7 @@
           <a:p>
             <a:fld id="{8BCDE12B-C777-427F-8CA4-5EC371F042CC}" type="datetimeFigureOut">
               <a:rPr lang="en-AU" smtClean="0"/>
-              <a:t>23/08/2023</a:t>
+              <a:t>26/10/2023</a:t>
             </a:fld>
             <a:endParaRPr lang="en-AU"/>
           </a:p>
@@ -2081,7 +2086,7 @@
           <a:p>
             <a:fld id="{8BCDE12B-C777-427F-8CA4-5EC371F042CC}" type="datetimeFigureOut">
               <a:rPr lang="en-AU" smtClean="0"/>
-              <a:t>23/08/2023</a:t>
+              <a:t>26/10/2023</a:t>
             </a:fld>
             <a:endParaRPr lang="en-AU"/>
           </a:p>
@@ -2394,7 +2399,7 @@
           <a:p>
             <a:fld id="{8BCDE12B-C777-427F-8CA4-5EC371F042CC}" type="datetimeFigureOut">
               <a:rPr lang="en-AU" smtClean="0"/>
-              <a:t>23/08/2023</a:t>
+              <a:t>26/10/2023</a:t>
             </a:fld>
             <a:endParaRPr lang="en-AU"/>
           </a:p>
@@ -2683,7 +2688,7 @@
           <a:p>
             <a:fld id="{8BCDE12B-C777-427F-8CA4-5EC371F042CC}" type="datetimeFigureOut">
               <a:rPr lang="en-AU" smtClean="0"/>
-              <a:t>23/08/2023</a:t>
+              <a:t>26/10/2023</a:t>
             </a:fld>
             <a:endParaRPr lang="en-AU"/>
           </a:p>
@@ -2926,7 +2931,7 @@
           <a:p>
             <a:fld id="{8BCDE12B-C777-427F-8CA4-5EC371F042CC}" type="datetimeFigureOut">
               <a:rPr lang="en-AU" smtClean="0"/>
-              <a:t>23/08/2023</a:t>
+              <a:t>26/10/2023</a:t>
             </a:fld>
             <a:endParaRPr lang="en-AU"/>
           </a:p>
@@ -3517,9 +3522,8 @@
             <a:pPr algn="ctr"/>
             <a:r>
               <a:rPr lang="en-US" dirty="0"/>
-              <a:t>Choosing new location</a:t>
-            </a:r>
-            <a:endParaRPr lang="en-AU" dirty="0"/>
+              <a:t>Find a location to go</a:t>
+            </a:r>
           </a:p>
         </p:txBody>
       </p:sp>
@@ -4615,8 +4619,8 @@
         </p:nvSpPr>
         <p:spPr>
           <a:xfrm>
-            <a:off x="1672936" y="1708882"/>
-            <a:ext cx="1080000" cy="369332"/>
+            <a:off x="303116" y="5911118"/>
+            <a:ext cx="1080000" cy="646331"/>
           </a:xfrm>
           <a:prstGeom prst="rect">
             <a:avLst/>
@@ -4652,6 +4656,10 @@
           </a:bodyPr>
           <a:lstStyle/>
           <a:p>
+            <a:r>
+              <a:rPr lang="en-US" dirty="0"/>
+              <a:t>Player in radius</a:t>
+            </a:r>
             <a:endParaRPr lang="en-AU" dirty="0"/>
           </a:p>
         </p:txBody>

</xml_diff>

<commit_message>
Got some help now just need to finish so meeting can happen
</commit_message>
<xml_diff>
--- a/Informational Technology (Game Design)/Part 2 Redo/Cluster 3D game development/AT03/AI Behaviour Chart.pptx
+++ b/Informational Technology (Game Design)/Part 2 Redo/Cluster 3D game development/AT03/AI Behaviour Chart.pptx
@@ -262,7 +262,7 @@
           <a:p>
             <a:fld id="{8BCDE12B-C777-427F-8CA4-5EC371F042CC}" type="datetimeFigureOut">
               <a:rPr lang="en-AU" smtClean="0"/>
-              <a:t>26/10/2023</a:t>
+              <a:t>27/11/2023</a:t>
             </a:fld>
             <a:endParaRPr lang="en-AU"/>
           </a:p>
@@ -462,7 +462,7 @@
           <a:p>
             <a:fld id="{8BCDE12B-C777-427F-8CA4-5EC371F042CC}" type="datetimeFigureOut">
               <a:rPr lang="en-AU" smtClean="0"/>
-              <a:t>26/10/2023</a:t>
+              <a:t>27/11/2023</a:t>
             </a:fld>
             <a:endParaRPr lang="en-AU"/>
           </a:p>
@@ -672,7 +672,7 @@
           <a:p>
             <a:fld id="{8BCDE12B-C777-427F-8CA4-5EC371F042CC}" type="datetimeFigureOut">
               <a:rPr lang="en-AU" smtClean="0"/>
-              <a:t>26/10/2023</a:t>
+              <a:t>27/11/2023</a:t>
             </a:fld>
             <a:endParaRPr lang="en-AU"/>
           </a:p>
@@ -872,7 +872,7 @@
           <a:p>
             <a:fld id="{8BCDE12B-C777-427F-8CA4-5EC371F042CC}" type="datetimeFigureOut">
               <a:rPr lang="en-AU" smtClean="0"/>
-              <a:t>26/10/2023</a:t>
+              <a:t>27/11/2023</a:t>
             </a:fld>
             <a:endParaRPr lang="en-AU"/>
           </a:p>
@@ -1148,7 +1148,7 @@
           <a:p>
             <a:fld id="{8BCDE12B-C777-427F-8CA4-5EC371F042CC}" type="datetimeFigureOut">
               <a:rPr lang="en-AU" smtClean="0"/>
-              <a:t>26/10/2023</a:t>
+              <a:t>27/11/2023</a:t>
             </a:fld>
             <a:endParaRPr lang="en-AU"/>
           </a:p>
@@ -1416,7 +1416,7 @@
           <a:p>
             <a:fld id="{8BCDE12B-C777-427F-8CA4-5EC371F042CC}" type="datetimeFigureOut">
               <a:rPr lang="en-AU" smtClean="0"/>
-              <a:t>26/10/2023</a:t>
+              <a:t>27/11/2023</a:t>
             </a:fld>
             <a:endParaRPr lang="en-AU"/>
           </a:p>
@@ -1831,7 +1831,7 @@
           <a:p>
             <a:fld id="{8BCDE12B-C777-427F-8CA4-5EC371F042CC}" type="datetimeFigureOut">
               <a:rPr lang="en-AU" smtClean="0"/>
-              <a:t>26/10/2023</a:t>
+              <a:t>27/11/2023</a:t>
             </a:fld>
             <a:endParaRPr lang="en-AU"/>
           </a:p>
@@ -1973,7 +1973,7 @@
           <a:p>
             <a:fld id="{8BCDE12B-C777-427F-8CA4-5EC371F042CC}" type="datetimeFigureOut">
               <a:rPr lang="en-AU" smtClean="0"/>
-              <a:t>26/10/2023</a:t>
+              <a:t>27/11/2023</a:t>
             </a:fld>
             <a:endParaRPr lang="en-AU"/>
           </a:p>
@@ -2086,7 +2086,7 @@
           <a:p>
             <a:fld id="{8BCDE12B-C777-427F-8CA4-5EC371F042CC}" type="datetimeFigureOut">
               <a:rPr lang="en-AU" smtClean="0"/>
-              <a:t>26/10/2023</a:t>
+              <a:t>27/11/2023</a:t>
             </a:fld>
             <a:endParaRPr lang="en-AU"/>
           </a:p>
@@ -2399,7 +2399,7 @@
           <a:p>
             <a:fld id="{8BCDE12B-C777-427F-8CA4-5EC371F042CC}" type="datetimeFigureOut">
               <a:rPr lang="en-AU" smtClean="0"/>
-              <a:t>26/10/2023</a:t>
+              <a:t>27/11/2023</a:t>
             </a:fld>
             <a:endParaRPr lang="en-AU"/>
           </a:p>
@@ -2688,7 +2688,7 @@
           <a:p>
             <a:fld id="{8BCDE12B-C777-427F-8CA4-5EC371F042CC}" type="datetimeFigureOut">
               <a:rPr lang="en-AU" smtClean="0"/>
-              <a:t>26/10/2023</a:t>
+              <a:t>27/11/2023</a:t>
             </a:fld>
             <a:endParaRPr lang="en-AU"/>
           </a:p>
@@ -2931,7 +2931,7 @@
           <a:p>
             <a:fld id="{8BCDE12B-C777-427F-8CA4-5EC371F042CC}" type="datetimeFigureOut">
               <a:rPr lang="en-AU" smtClean="0"/>
-              <a:t>26/10/2023</a:t>
+              <a:t>27/11/2023</a:t>
             </a:fld>
             <a:endParaRPr lang="en-AU"/>
           </a:p>
@@ -3442,7 +3442,7 @@
         </p:nvSpPr>
         <p:spPr>
           <a:xfrm>
-            <a:off x="5556000" y="74482"/>
+            <a:off x="5556000" y="614482"/>
             <a:ext cx="1080000" cy="720000"/>
           </a:xfrm>
           <a:prstGeom prst="ellipse">
@@ -3492,8 +3492,8 @@
         </p:nvSpPr>
         <p:spPr>
           <a:xfrm>
-            <a:off x="5556000" y="1269000"/>
-            <a:ext cx="1080000" cy="720000"/>
+            <a:off x="5546578" y="1638048"/>
+            <a:ext cx="1080000" cy="1080000"/>
           </a:xfrm>
           <a:prstGeom prst="flowChartProcess">
             <a:avLst/>
@@ -3522,7 +3522,7 @@
             <a:pPr algn="ctr"/>
             <a:r>
               <a:rPr lang="en-US" dirty="0"/>
-              <a:t>Find a location to go</a:t>
+              <a:t>Idle</a:t>
             </a:r>
           </a:p>
         </p:txBody>
@@ -3541,8 +3541,8 @@
         </p:nvSpPr>
         <p:spPr>
           <a:xfrm>
-            <a:off x="3307774" y="3069000"/>
-            <a:ext cx="1080000" cy="720000"/>
+            <a:off x="4461867" y="3072482"/>
+            <a:ext cx="1080000" cy="1080000"/>
           </a:xfrm>
           <a:prstGeom prst="flowChartProcess">
             <a:avLst/>
@@ -3571,7 +3571,7 @@
             <a:pPr algn="ctr"/>
             <a:r>
               <a:rPr lang="en-US" dirty="0"/>
-              <a:t>Chase Player</a:t>
+              <a:t>Chase</a:t>
             </a:r>
           </a:p>
         </p:txBody>
@@ -3590,8 +3590,8 @@
         </p:nvSpPr>
         <p:spPr>
           <a:xfrm>
-            <a:off x="5376000" y="3069000"/>
-            <a:ext cx="1440000" cy="720000"/>
+            <a:off x="621940" y="4814119"/>
+            <a:ext cx="1080000" cy="1080000"/>
           </a:xfrm>
           <a:prstGeom prst="flowChartProcess">
             <a:avLst/>
@@ -3640,8 +3640,8 @@
         </p:nvSpPr>
         <p:spPr>
           <a:xfrm>
-            <a:off x="7804226" y="3069000"/>
-            <a:ext cx="1080000" cy="720000"/>
+            <a:off x="6626578" y="3072482"/>
+            <a:ext cx="1080000" cy="1080000"/>
           </a:xfrm>
           <a:prstGeom prst="flowChartProcess">
             <a:avLst/>
@@ -3670,7 +3670,7 @@
             <a:pPr algn="ctr"/>
             <a:r>
               <a:rPr lang="en-US" dirty="0"/>
-              <a:t>Move to chosen location</a:t>
+              <a:t>Wonder</a:t>
             </a:r>
             <a:endParaRPr lang="en-AU" dirty="0"/>
           </a:p>
@@ -3690,8 +3690,8 @@
         </p:nvSpPr>
         <p:spPr>
           <a:xfrm>
-            <a:off x="5366578" y="4869000"/>
-            <a:ext cx="1440000" cy="720000"/>
+            <a:off x="5556000" y="4507709"/>
+            <a:ext cx="1080000" cy="1080000"/>
           </a:xfrm>
           <a:prstGeom prst="flowChartProcess">
             <a:avLst/>
@@ -3720,7 +3720,7 @@
             <a:pPr algn="ctr"/>
             <a:r>
               <a:rPr lang="en-US" dirty="0"/>
-              <a:t>Player interacted with me</a:t>
+              <a:t>Stun</a:t>
             </a:r>
             <a:endParaRPr lang="en-AU" dirty="0"/>
           </a:p>
@@ -3742,9 +3742,9 @@
           <p:nvPr/>
         </p:nvCxnSpPr>
         <p:spPr>
-          <a:xfrm>
-            <a:off x="6096000" y="794482"/>
-            <a:ext cx="0" cy="474518"/>
+          <a:xfrm flipH="1">
+            <a:off x="6086578" y="1334482"/>
+            <a:ext cx="9422" cy="303566"/>
           </a:xfrm>
           <a:prstGeom prst="straightConnector1">
             <a:avLst/>
@@ -3785,8 +3785,8 @@
         </p:nvCxnSpPr>
         <p:spPr>
           <a:xfrm flipH="1">
-            <a:off x="3847774" y="1629000"/>
-            <a:ext cx="1708226" cy="1440000"/>
+            <a:off x="5001867" y="2178048"/>
+            <a:ext cx="544711" cy="894434"/>
           </a:xfrm>
           <a:prstGeom prst="straightConnector1">
             <a:avLst/>
@@ -3827,8 +3827,8 @@
         </p:nvCxnSpPr>
         <p:spPr>
           <a:xfrm flipV="1">
-            <a:off x="4387774" y="1989000"/>
-            <a:ext cx="1708226" cy="1440000"/>
+            <a:off x="5541867" y="2718048"/>
+            <a:ext cx="544711" cy="894434"/>
           </a:xfrm>
           <a:prstGeom prst="straightConnector1">
             <a:avLst/>
@@ -3869,8 +3869,8 @@
         </p:nvCxnSpPr>
         <p:spPr>
           <a:xfrm>
-            <a:off x="6636000" y="1629000"/>
-            <a:ext cx="1708226" cy="1440000"/>
+            <a:off x="6626578" y="2178048"/>
+            <a:ext cx="540000" cy="894434"/>
           </a:xfrm>
           <a:prstGeom prst="straightConnector1">
             <a:avLst/>
@@ -3911,8 +3911,8 @@
         </p:nvCxnSpPr>
         <p:spPr>
           <a:xfrm flipH="1" flipV="1">
-            <a:off x="6096000" y="1989000"/>
-            <a:ext cx="1708226" cy="1440000"/>
+            <a:off x="6086578" y="2718048"/>
+            <a:ext cx="540000" cy="894434"/>
           </a:xfrm>
           <a:prstGeom prst="straightConnector1">
             <a:avLst/>
@@ -3954,8 +3954,8 @@
         </p:nvCxnSpPr>
         <p:spPr>
           <a:xfrm>
-            <a:off x="4387774" y="3429000"/>
-            <a:ext cx="1698804" cy="1440000"/>
+            <a:off x="5541867" y="3612482"/>
+            <a:ext cx="554133" cy="895227"/>
           </a:xfrm>
           <a:prstGeom prst="straightConnector1">
             <a:avLst/>
@@ -3997,8 +3997,8 @@
         </p:nvCxnSpPr>
         <p:spPr>
           <a:xfrm flipH="1">
-            <a:off x="6086578" y="3429000"/>
-            <a:ext cx="1717648" cy="1440000"/>
+            <a:off x="6096000" y="3612482"/>
+            <a:ext cx="530578" cy="895227"/>
           </a:xfrm>
           <a:prstGeom prst="straightConnector1">
             <a:avLst/>
@@ -4033,13 +4033,15 @@
           </p:cNvPr>
           <p:cNvCxnSpPr>
             <a:cxnSpLocks/>
+            <a:stCxn id="7" idx="1"/>
+            <a:endCxn id="4" idx="2"/>
           </p:cNvCxnSpPr>
           <p:nvPr/>
         </p:nvCxnSpPr>
         <p:spPr>
           <a:xfrm flipH="1" flipV="1">
-            <a:off x="3847774" y="3789000"/>
-            <a:ext cx="1518804" cy="1440000"/>
+            <a:off x="5001867" y="4152482"/>
+            <a:ext cx="554133" cy="895227"/>
           </a:xfrm>
           <a:prstGeom prst="straightConnector1">
             <a:avLst/>
@@ -4080,8 +4082,8 @@
         </p:nvCxnSpPr>
         <p:spPr>
           <a:xfrm flipV="1">
-            <a:off x="6806578" y="3789000"/>
-            <a:ext cx="1537648" cy="1440000"/>
+            <a:off x="6636000" y="4152482"/>
+            <a:ext cx="530578" cy="895227"/>
           </a:xfrm>
           <a:prstGeom prst="straightConnector1">
             <a:avLst/>
@@ -4105,506 +4107,6 @@
           </a:fontRef>
         </p:style>
       </p:cxnSp>
-      <p:cxnSp>
-        <p:nvCxnSpPr>
-          <p:cNvPr id="39" name="Straight Arrow Connector 38">
-            <a:extLst>
-              <a:ext uri="{FF2B5EF4-FFF2-40B4-BE49-F238E27FC236}">
-                <a16:creationId xmlns:a16="http://schemas.microsoft.com/office/drawing/2014/main" id="{FAE90FEC-BB0B-EB13-3CD2-947E5817C395}"/>
-              </a:ext>
-            </a:extLst>
-          </p:cNvPr>
-          <p:cNvCxnSpPr>
-            <a:cxnSpLocks/>
-            <a:stCxn id="5" idx="2"/>
-            <a:endCxn id="7" idx="0"/>
-          </p:cNvCxnSpPr>
-          <p:nvPr/>
-        </p:nvCxnSpPr>
-        <p:spPr>
-          <a:xfrm flipH="1">
-            <a:off x="6086578" y="3789000"/>
-            <a:ext cx="9422" cy="1080000"/>
-          </a:xfrm>
-          <a:prstGeom prst="straightConnector1">
-            <a:avLst/>
-          </a:prstGeom>
-          <a:ln>
-            <a:headEnd type="triangle"/>
-            <a:tailEnd type="triangle"/>
-          </a:ln>
-        </p:spPr>
-        <p:style>
-          <a:lnRef idx="1">
-            <a:schemeClr val="accent1"/>
-          </a:lnRef>
-          <a:fillRef idx="0">
-            <a:schemeClr val="accent1"/>
-          </a:fillRef>
-          <a:effectRef idx="0">
-            <a:schemeClr val="accent1"/>
-          </a:effectRef>
-          <a:fontRef idx="minor">
-            <a:schemeClr val="tx1"/>
-          </a:fontRef>
-        </p:style>
-      </p:cxnSp>
-      <p:cxnSp>
-        <p:nvCxnSpPr>
-          <p:cNvPr id="44" name="Straight Arrow Connector 43">
-            <a:extLst>
-              <a:ext uri="{FF2B5EF4-FFF2-40B4-BE49-F238E27FC236}">
-                <a16:creationId xmlns:a16="http://schemas.microsoft.com/office/drawing/2014/main" id="{7DFCDB4F-BAE4-188D-C7E3-4FC2251FC99F}"/>
-              </a:ext>
-            </a:extLst>
-          </p:cNvPr>
-          <p:cNvCxnSpPr>
-            <a:stCxn id="4" idx="3"/>
-            <a:endCxn id="5" idx="1"/>
-          </p:cNvCxnSpPr>
-          <p:nvPr/>
-        </p:nvCxnSpPr>
-        <p:spPr>
-          <a:xfrm>
-            <a:off x="4387774" y="3429000"/>
-            <a:ext cx="988226" cy="0"/>
-          </a:xfrm>
-          <a:prstGeom prst="straightConnector1">
-            <a:avLst/>
-          </a:prstGeom>
-          <a:ln>
-            <a:tailEnd type="triangle"/>
-          </a:ln>
-        </p:spPr>
-        <p:style>
-          <a:lnRef idx="1">
-            <a:schemeClr val="accent1"/>
-          </a:lnRef>
-          <a:fillRef idx="0">
-            <a:schemeClr val="accent1"/>
-          </a:fillRef>
-          <a:effectRef idx="0">
-            <a:schemeClr val="accent1"/>
-          </a:effectRef>
-          <a:fontRef idx="minor">
-            <a:schemeClr val="tx1"/>
-          </a:fontRef>
-        </p:style>
-      </p:cxnSp>
-      <p:cxnSp>
-        <p:nvCxnSpPr>
-          <p:cNvPr id="46" name="Straight Arrow Connector 45">
-            <a:extLst>
-              <a:ext uri="{FF2B5EF4-FFF2-40B4-BE49-F238E27FC236}">
-                <a16:creationId xmlns:a16="http://schemas.microsoft.com/office/drawing/2014/main" id="{71F752ED-34BF-A832-CCD2-62620BE8B465}"/>
-              </a:ext>
-            </a:extLst>
-          </p:cNvPr>
-          <p:cNvCxnSpPr>
-            <a:stCxn id="3" idx="2"/>
-            <a:endCxn id="5" idx="0"/>
-          </p:cNvCxnSpPr>
-          <p:nvPr/>
-        </p:nvCxnSpPr>
-        <p:spPr>
-          <a:xfrm>
-            <a:off x="6096000" y="1989000"/>
-            <a:ext cx="0" cy="1080000"/>
-          </a:xfrm>
-          <a:prstGeom prst="straightConnector1">
-            <a:avLst/>
-          </a:prstGeom>
-          <a:ln>
-            <a:tailEnd type="triangle"/>
-          </a:ln>
-        </p:spPr>
-        <p:style>
-          <a:lnRef idx="1">
-            <a:schemeClr val="accent1"/>
-          </a:lnRef>
-          <a:fillRef idx="0">
-            <a:schemeClr val="accent1"/>
-          </a:fillRef>
-          <a:effectRef idx="0">
-            <a:schemeClr val="accent1"/>
-          </a:effectRef>
-          <a:fontRef idx="minor">
-            <a:schemeClr val="tx1"/>
-          </a:fontRef>
-        </p:style>
-      </p:cxnSp>
-      <p:cxnSp>
-        <p:nvCxnSpPr>
-          <p:cNvPr id="48" name="Straight Arrow Connector 47">
-            <a:extLst>
-              <a:ext uri="{FF2B5EF4-FFF2-40B4-BE49-F238E27FC236}">
-                <a16:creationId xmlns:a16="http://schemas.microsoft.com/office/drawing/2014/main" id="{424BEC0C-0E8F-5C42-DFA6-C2395705A68C}"/>
-              </a:ext>
-            </a:extLst>
-          </p:cNvPr>
-          <p:cNvCxnSpPr>
-            <a:stCxn id="6" idx="1"/>
-            <a:endCxn id="5" idx="3"/>
-          </p:cNvCxnSpPr>
-          <p:nvPr/>
-        </p:nvCxnSpPr>
-        <p:spPr>
-          <a:xfrm flipH="1">
-            <a:off x="6816000" y="3429000"/>
-            <a:ext cx="988226" cy="0"/>
-          </a:xfrm>
-          <a:prstGeom prst="straightConnector1">
-            <a:avLst/>
-          </a:prstGeom>
-          <a:ln>
-            <a:tailEnd type="triangle"/>
-          </a:ln>
-        </p:spPr>
-        <p:style>
-          <a:lnRef idx="1">
-            <a:schemeClr val="accent1"/>
-          </a:lnRef>
-          <a:fillRef idx="0">
-            <a:schemeClr val="accent1"/>
-          </a:fillRef>
-          <a:effectRef idx="0">
-            <a:schemeClr val="accent1"/>
-          </a:effectRef>
-          <a:fontRef idx="minor">
-            <a:schemeClr val="tx1"/>
-          </a:fontRef>
-        </p:style>
-      </p:cxnSp>
-      <p:sp>
-        <p:nvSpPr>
-          <p:cNvPr id="71" name="TextBox 70">
-            <a:extLst>
-              <a:ext uri="{FF2B5EF4-FFF2-40B4-BE49-F238E27FC236}">
-                <a16:creationId xmlns:a16="http://schemas.microsoft.com/office/drawing/2014/main" id="{7FA343E4-FA94-A794-7471-97703BBED266}"/>
-              </a:ext>
-            </a:extLst>
-          </p:cNvPr>
-          <p:cNvSpPr txBox="1"/>
-          <p:nvPr/>
-        </p:nvSpPr>
-        <p:spPr>
-          <a:xfrm>
-            <a:off x="758536" y="794482"/>
-            <a:ext cx="1080000" cy="369332"/>
-          </a:xfrm>
-          <a:prstGeom prst="rect">
-            <a:avLst/>
-          </a:prstGeom>
-          <a:noFill/>
-          <a:ln w="9525" cap="flat" cmpd="sng" algn="ctr">
-            <a:solidFill>
-              <a:schemeClr val="dk1"/>
-            </a:solidFill>
-            <a:prstDash val="solid"/>
-            <a:round/>
-            <a:headEnd type="none" w="med" len="med"/>
-            <a:tailEnd type="none" w="med" len="med"/>
-          </a:ln>
-        </p:spPr>
-        <p:style>
-          <a:lnRef idx="0">
-            <a:scrgbClr r="0" g="0" b="0"/>
-          </a:lnRef>
-          <a:fillRef idx="0">
-            <a:scrgbClr r="0" g="0" b="0"/>
-          </a:fillRef>
-          <a:effectRef idx="0">
-            <a:scrgbClr r="0" g="0" b="0"/>
-          </a:effectRef>
-          <a:fontRef idx="minor">
-            <a:schemeClr val="dk1"/>
-          </a:fontRef>
-        </p:style>
-        <p:txBody>
-          <a:bodyPr wrap="square" rtlCol="0">
-            <a:spAutoFit/>
-          </a:bodyPr>
-          <a:lstStyle/>
-          <a:p>
-            <a:endParaRPr lang="en-AU" dirty="0"/>
-          </a:p>
-        </p:txBody>
-      </p:sp>
-      <p:sp>
-        <p:nvSpPr>
-          <p:cNvPr id="72" name="TextBox 71">
-            <a:extLst>
-              <a:ext uri="{FF2B5EF4-FFF2-40B4-BE49-F238E27FC236}">
-                <a16:creationId xmlns:a16="http://schemas.microsoft.com/office/drawing/2014/main" id="{D951CD5E-B20B-07AE-C5B3-A526C58A9417}"/>
-              </a:ext>
-            </a:extLst>
-          </p:cNvPr>
-          <p:cNvSpPr txBox="1"/>
-          <p:nvPr/>
-        </p:nvSpPr>
-        <p:spPr>
-          <a:xfrm>
-            <a:off x="910936" y="946882"/>
-            <a:ext cx="1080000" cy="369332"/>
-          </a:xfrm>
-          <a:prstGeom prst="rect">
-            <a:avLst/>
-          </a:prstGeom>
-          <a:noFill/>
-          <a:ln w="9525" cap="flat" cmpd="sng" algn="ctr">
-            <a:solidFill>
-              <a:schemeClr val="dk1"/>
-            </a:solidFill>
-            <a:prstDash val="solid"/>
-            <a:round/>
-            <a:headEnd type="none" w="med" len="med"/>
-            <a:tailEnd type="none" w="med" len="med"/>
-          </a:ln>
-        </p:spPr>
-        <p:style>
-          <a:lnRef idx="0">
-            <a:scrgbClr r="0" g="0" b="0"/>
-          </a:lnRef>
-          <a:fillRef idx="0">
-            <a:scrgbClr r="0" g="0" b="0"/>
-          </a:fillRef>
-          <a:effectRef idx="0">
-            <a:scrgbClr r="0" g="0" b="0"/>
-          </a:effectRef>
-          <a:fontRef idx="minor">
-            <a:schemeClr val="dk1"/>
-          </a:fontRef>
-        </p:style>
-        <p:txBody>
-          <a:bodyPr wrap="square" rtlCol="0">
-            <a:spAutoFit/>
-          </a:bodyPr>
-          <a:lstStyle/>
-          <a:p>
-            <a:endParaRPr lang="en-AU" dirty="0"/>
-          </a:p>
-        </p:txBody>
-      </p:sp>
-      <p:sp>
-        <p:nvSpPr>
-          <p:cNvPr id="73" name="TextBox 72">
-            <a:extLst>
-              <a:ext uri="{FF2B5EF4-FFF2-40B4-BE49-F238E27FC236}">
-                <a16:creationId xmlns:a16="http://schemas.microsoft.com/office/drawing/2014/main" id="{A52137C8-A04B-1E52-14E7-FBDA4F706AD4}"/>
-              </a:ext>
-            </a:extLst>
-          </p:cNvPr>
-          <p:cNvSpPr txBox="1"/>
-          <p:nvPr/>
-        </p:nvSpPr>
-        <p:spPr>
-          <a:xfrm>
-            <a:off x="1063336" y="1099282"/>
-            <a:ext cx="1080000" cy="369332"/>
-          </a:xfrm>
-          <a:prstGeom prst="rect">
-            <a:avLst/>
-          </a:prstGeom>
-          <a:noFill/>
-          <a:ln w="9525" cap="flat" cmpd="sng" algn="ctr">
-            <a:solidFill>
-              <a:schemeClr val="dk1"/>
-            </a:solidFill>
-            <a:prstDash val="solid"/>
-            <a:round/>
-            <a:headEnd type="none" w="med" len="med"/>
-            <a:tailEnd type="none" w="med" len="med"/>
-          </a:ln>
-        </p:spPr>
-        <p:style>
-          <a:lnRef idx="0">
-            <a:scrgbClr r="0" g="0" b="0"/>
-          </a:lnRef>
-          <a:fillRef idx="0">
-            <a:scrgbClr r="0" g="0" b="0"/>
-          </a:fillRef>
-          <a:effectRef idx="0">
-            <a:scrgbClr r="0" g="0" b="0"/>
-          </a:effectRef>
-          <a:fontRef idx="minor">
-            <a:schemeClr val="dk1"/>
-          </a:fontRef>
-        </p:style>
-        <p:txBody>
-          <a:bodyPr wrap="square" rtlCol="0">
-            <a:spAutoFit/>
-          </a:bodyPr>
-          <a:lstStyle/>
-          <a:p>
-            <a:endParaRPr lang="en-AU" dirty="0"/>
-          </a:p>
-        </p:txBody>
-      </p:sp>
-      <p:sp>
-        <p:nvSpPr>
-          <p:cNvPr id="74" name="TextBox 73">
-            <a:extLst>
-              <a:ext uri="{FF2B5EF4-FFF2-40B4-BE49-F238E27FC236}">
-                <a16:creationId xmlns:a16="http://schemas.microsoft.com/office/drawing/2014/main" id="{186828AB-4464-9A64-FBEF-7DE75D8E3FA4}"/>
-              </a:ext>
-            </a:extLst>
-          </p:cNvPr>
-          <p:cNvSpPr txBox="1"/>
-          <p:nvPr/>
-        </p:nvSpPr>
-        <p:spPr>
-          <a:xfrm>
-            <a:off x="1215736" y="1251682"/>
-            <a:ext cx="1080000" cy="369332"/>
-          </a:xfrm>
-          <a:prstGeom prst="rect">
-            <a:avLst/>
-          </a:prstGeom>
-          <a:noFill/>
-          <a:ln w="9525" cap="flat" cmpd="sng" algn="ctr">
-            <a:solidFill>
-              <a:schemeClr val="dk1"/>
-            </a:solidFill>
-            <a:prstDash val="solid"/>
-            <a:round/>
-            <a:headEnd type="none" w="med" len="med"/>
-            <a:tailEnd type="none" w="med" len="med"/>
-          </a:ln>
-        </p:spPr>
-        <p:style>
-          <a:lnRef idx="0">
-            <a:scrgbClr r="0" g="0" b="0"/>
-          </a:lnRef>
-          <a:fillRef idx="0">
-            <a:scrgbClr r="0" g="0" b="0"/>
-          </a:fillRef>
-          <a:effectRef idx="0">
-            <a:scrgbClr r="0" g="0" b="0"/>
-          </a:effectRef>
-          <a:fontRef idx="minor">
-            <a:schemeClr val="dk1"/>
-          </a:fontRef>
-        </p:style>
-        <p:txBody>
-          <a:bodyPr wrap="square" rtlCol="0">
-            <a:spAutoFit/>
-          </a:bodyPr>
-          <a:lstStyle/>
-          <a:p>
-            <a:endParaRPr lang="en-AU" dirty="0"/>
-          </a:p>
-        </p:txBody>
-      </p:sp>
-      <p:sp>
-        <p:nvSpPr>
-          <p:cNvPr id="75" name="TextBox 74">
-            <a:extLst>
-              <a:ext uri="{FF2B5EF4-FFF2-40B4-BE49-F238E27FC236}">
-                <a16:creationId xmlns:a16="http://schemas.microsoft.com/office/drawing/2014/main" id="{710F22BD-BD8A-A55F-B202-57BFEB766DE4}"/>
-              </a:ext>
-            </a:extLst>
-          </p:cNvPr>
-          <p:cNvSpPr txBox="1"/>
-          <p:nvPr/>
-        </p:nvSpPr>
-        <p:spPr>
-          <a:xfrm>
-            <a:off x="1368136" y="1404082"/>
-            <a:ext cx="1080000" cy="369332"/>
-          </a:xfrm>
-          <a:prstGeom prst="rect">
-            <a:avLst/>
-          </a:prstGeom>
-          <a:noFill/>
-          <a:ln w="9525" cap="flat" cmpd="sng" algn="ctr">
-            <a:solidFill>
-              <a:schemeClr val="dk1"/>
-            </a:solidFill>
-            <a:prstDash val="solid"/>
-            <a:round/>
-            <a:headEnd type="none" w="med" len="med"/>
-            <a:tailEnd type="none" w="med" len="med"/>
-          </a:ln>
-        </p:spPr>
-        <p:style>
-          <a:lnRef idx="0">
-            <a:scrgbClr r="0" g="0" b="0"/>
-          </a:lnRef>
-          <a:fillRef idx="0">
-            <a:scrgbClr r="0" g="0" b="0"/>
-          </a:fillRef>
-          <a:effectRef idx="0">
-            <a:scrgbClr r="0" g="0" b="0"/>
-          </a:effectRef>
-          <a:fontRef idx="minor">
-            <a:schemeClr val="dk1"/>
-          </a:fontRef>
-        </p:style>
-        <p:txBody>
-          <a:bodyPr wrap="square" rtlCol="0">
-            <a:spAutoFit/>
-          </a:bodyPr>
-          <a:lstStyle/>
-          <a:p>
-            <a:endParaRPr lang="en-AU" dirty="0"/>
-          </a:p>
-        </p:txBody>
-      </p:sp>
-      <p:sp>
-        <p:nvSpPr>
-          <p:cNvPr id="76" name="TextBox 75">
-            <a:extLst>
-              <a:ext uri="{FF2B5EF4-FFF2-40B4-BE49-F238E27FC236}">
-                <a16:creationId xmlns:a16="http://schemas.microsoft.com/office/drawing/2014/main" id="{82B6E6E5-1151-5413-443B-6CEA0FC4DEEB}"/>
-              </a:ext>
-            </a:extLst>
-          </p:cNvPr>
-          <p:cNvSpPr txBox="1"/>
-          <p:nvPr/>
-        </p:nvSpPr>
-        <p:spPr>
-          <a:xfrm>
-            <a:off x="1520536" y="1556482"/>
-            <a:ext cx="1080000" cy="369332"/>
-          </a:xfrm>
-          <a:prstGeom prst="rect">
-            <a:avLst/>
-          </a:prstGeom>
-          <a:noFill/>
-          <a:ln w="9525" cap="flat" cmpd="sng" algn="ctr">
-            <a:solidFill>
-              <a:schemeClr val="dk1"/>
-            </a:solidFill>
-            <a:prstDash val="solid"/>
-            <a:round/>
-            <a:headEnd type="none" w="med" len="med"/>
-            <a:tailEnd type="none" w="med" len="med"/>
-          </a:ln>
-        </p:spPr>
-        <p:style>
-          <a:lnRef idx="0">
-            <a:scrgbClr r="0" g="0" b="0"/>
-          </a:lnRef>
-          <a:fillRef idx="0">
-            <a:scrgbClr r="0" g="0" b="0"/>
-          </a:fillRef>
-          <a:effectRef idx="0">
-            <a:scrgbClr r="0" g="0" b="0"/>
-          </a:effectRef>
-          <a:fontRef idx="minor">
-            <a:schemeClr val="dk1"/>
-          </a:fontRef>
-        </p:style>
-        <p:txBody>
-          <a:bodyPr wrap="square" rtlCol="0">
-            <a:spAutoFit/>
-          </a:bodyPr>
-          <a:lstStyle/>
-          <a:p>
-            <a:endParaRPr lang="en-AU" dirty="0"/>
-          </a:p>
-        </p:txBody>
-      </p:sp>
       <p:sp>
         <p:nvSpPr>
           <p:cNvPr id="77" name="TextBox 76">
@@ -4678,7 +4180,7 @@
         </p:nvSpPr>
         <p:spPr>
           <a:xfrm rot="19155587">
-            <a:off x="4606885" y="2324152"/>
+            <a:off x="287924" y="2909633"/>
             <a:ext cx="1080000" cy="400110"/>
           </a:xfrm>
           <a:prstGeom prst="rect">
@@ -4724,6 +4226,50 @@
           </a:p>
         </p:txBody>
       </p:sp>
+      <p:cxnSp>
+        <p:nvCxnSpPr>
+          <p:cNvPr id="37" name="Straight Arrow Connector 36">
+            <a:extLst>
+              <a:ext uri="{FF2B5EF4-FFF2-40B4-BE49-F238E27FC236}">
+                <a16:creationId xmlns:a16="http://schemas.microsoft.com/office/drawing/2014/main" id="{B020B024-599A-F878-2393-C7CC276EC20C}"/>
+              </a:ext>
+            </a:extLst>
+          </p:cNvPr>
+          <p:cNvCxnSpPr>
+            <a:cxnSpLocks/>
+            <a:stCxn id="4" idx="3"/>
+            <a:endCxn id="6" idx="1"/>
+          </p:cNvCxnSpPr>
+          <p:nvPr/>
+        </p:nvCxnSpPr>
+        <p:spPr>
+          <a:xfrm>
+            <a:off x="5541867" y="3612482"/>
+            <a:ext cx="1084711" cy="0"/>
+          </a:xfrm>
+          <a:prstGeom prst="straightConnector1">
+            <a:avLst/>
+          </a:prstGeom>
+          <a:ln>
+            <a:headEnd type="triangle"/>
+            <a:tailEnd type="triangle"/>
+          </a:ln>
+        </p:spPr>
+        <p:style>
+          <a:lnRef idx="1">
+            <a:schemeClr val="accent1"/>
+          </a:lnRef>
+          <a:fillRef idx="0">
+            <a:schemeClr val="accent1"/>
+          </a:fillRef>
+          <a:effectRef idx="0">
+            <a:schemeClr val="accent1"/>
+          </a:effectRef>
+          <a:fontRef idx="minor">
+            <a:schemeClr val="tx1"/>
+          </a:fontRef>
+        </p:style>
+      </p:cxnSp>
     </p:spTree>
     <p:extLst>
       <p:ext uri="{BB962C8B-B14F-4D97-AF65-F5344CB8AC3E}">

</xml_diff>